<commit_message>
Add July events to landing page and update gitignore to avoid tracking the ppt temp files.
</commit_message>
<xml_diff>
--- a/marketing/sciware-hall-slide/sciware-06-Oct-21.pptx
+++ b/marketing/sciware-hall-slide/sciware-06-Oct-21.pptx
@@ -275,7 +275,7 @@
           <a:p>
             <a:fld id="{1160EA64-D806-43AC-9DF2-F8C432F32B4C}" type="datetimeFigureOut">
               <a:rPr lang="en-US" dirty="0"/>
-              <a:t>10/5/21</a:t>
+              <a:t>6/30/22</a:t>
             </a:fld>
             <a:endParaRPr lang="en-US" dirty="0"/>
           </a:p>
@@ -441,7 +441,7 @@
           <a:p>
             <a:fld id="{E9F9C37B-1D36-470B-8223-D6C91242EC14}" type="datetimeFigureOut">
               <a:rPr lang="en-US" dirty="0"/>
-              <a:t>10/5/21</a:t>
+              <a:t>6/30/22</a:t>
             </a:fld>
             <a:endParaRPr lang="en-US" dirty="0"/>
           </a:p>
@@ -616,7 +616,7 @@
           <a:p>
             <a:fld id="{67C6F52A-A82B-47A2-A83A-8C4C91F2D59F}" type="datetimeFigureOut">
               <a:rPr lang="en-US" dirty="0"/>
-              <a:t>10/5/21</a:t>
+              <a:t>6/30/22</a:t>
             </a:fld>
             <a:endParaRPr lang="en-US" dirty="0"/>
           </a:p>
@@ -781,7 +781,7 @@
           <a:p>
             <a:fld id="{F070A7B3-6521-4DCA-87E5-044747A908C1}" type="datetimeFigureOut">
               <a:rPr lang="en-US" dirty="0"/>
-              <a:t>10/5/21</a:t>
+              <a:t>6/30/22</a:t>
             </a:fld>
             <a:endParaRPr lang="en-US" dirty="0"/>
           </a:p>
@@ -1045,7 +1045,7 @@
           <a:p>
             <a:fld id="{1160EA64-D806-43AC-9DF2-F8C432F32B4C}" type="datetimeFigureOut">
               <a:rPr lang="en-US" dirty="0"/>
-              <a:t>10/5/21</a:t>
+              <a:t>6/30/22</a:t>
             </a:fld>
             <a:endParaRPr lang="en-US" dirty="0"/>
           </a:p>
@@ -1273,7 +1273,7 @@
           <a:p>
             <a:fld id="{AB134690-1557-4C89-A502-4959FE7FAD70}" type="datetimeFigureOut">
               <a:rPr lang="en-US" dirty="0"/>
-              <a:t>10/5/21</a:t>
+              <a:t>6/30/22</a:t>
             </a:fld>
             <a:endParaRPr lang="en-US" dirty="0"/>
           </a:p>
@@ -1627,7 +1627,7 @@
           <a:p>
             <a:fld id="{4F7D4976-E339-4826-83B7-FBD03F55ECF8}" type="datetimeFigureOut">
               <a:rPr lang="en-US" dirty="0"/>
-              <a:t>10/5/21</a:t>
+              <a:t>6/30/22</a:t>
             </a:fld>
             <a:endParaRPr lang="en-US" dirty="0"/>
           </a:p>
@@ -1763,7 +1763,7 @@
           <a:p>
             <a:fld id="{E1037C31-9E7A-4F99-8774-A0E530DE1A42}" type="datetimeFigureOut">
               <a:rPr lang="en-US" dirty="0"/>
-              <a:t>10/5/21</a:t>
+              <a:t>6/30/22</a:t>
             </a:fld>
             <a:endParaRPr lang="en-US" dirty="0"/>
           </a:p>
@@ -1853,7 +1853,7 @@
           <a:p>
             <a:fld id="{C278504F-A551-4DE0-9316-4DCD1D8CC752}" type="datetimeFigureOut">
               <a:rPr lang="en-US" dirty="0"/>
-              <a:t>10/5/21</a:t>
+              <a:t>6/30/22</a:t>
             </a:fld>
             <a:endParaRPr lang="en-US" dirty="0"/>
           </a:p>
@@ -2205,7 +2205,7 @@
           <a:p>
             <a:fld id="{D1BE4249-C0D0-4B06-8692-E8BB871AF643}" type="datetimeFigureOut">
               <a:rPr lang="en-US" dirty="0"/>
-              <a:t>10/5/21</a:t>
+              <a:t>6/30/22</a:t>
             </a:fld>
             <a:endParaRPr lang="en-US" dirty="0"/>
           </a:p>
@@ -2557,7 +2557,7 @@
           <a:p>
             <a:fld id="{042B0DB6-F5C7-45FB-8CF3-31B45F9C2DAC}" type="datetimeFigureOut">
               <a:rPr lang="en-US" dirty="0"/>
-              <a:t>10/5/21</a:t>
+              <a:t>6/30/22</a:t>
             </a:fld>
             <a:endParaRPr lang="en-US" dirty="0"/>
           </a:p>
@@ -2794,7 +2794,7 @@
           <a:p>
             <a:fld id="{1160EA64-D806-43AC-9DF2-F8C432F32B4C}" type="datetimeFigureOut">
               <a:rPr lang="en-US" dirty="0"/>
-              <a:t>10/5/21</a:t>
+              <a:t>6/30/22</a:t>
             </a:fld>
             <a:endParaRPr lang="en-US" dirty="0"/>
           </a:p>

</xml_diff>